<commit_message>
Added pricing system and comic
</commit_message>
<xml_diff>
--- a/rbc_sab-berlin_2016/Poster_deNBI-epi_SAB-Meeting_2016.pptx
+++ b/rbc_sab-berlin_2016/Poster_deNBI-epi_SAB-Meeting_2016.pptx
@@ -53,7 +53,7 @@
       </p:grpSpPr>
       <p:sp>
         <p:nvSpPr>
-          <p:cNvPr id="21" name="PlaceHolder 1"/>
+          <p:cNvPr id="23" name="PlaceHolder 1"/>
           <p:cNvSpPr>
             <a:spLocks noGrp="1"/>
           </p:cNvSpPr>
@@ -90,7 +90,7 @@
       </p:sp>
       <p:sp>
         <p:nvSpPr>
-          <p:cNvPr id="22" name="PlaceHolder 2"/>
+          <p:cNvPr id="24" name="PlaceHolder 2"/>
           <p:cNvSpPr>
             <a:spLocks noGrp="1"/>
           </p:cNvSpPr>
@@ -126,7 +126,7 @@
       </p:sp>
       <p:sp>
         <p:nvSpPr>
-          <p:cNvPr id="23" name="PlaceHolder 3"/>
+          <p:cNvPr id="25" name="PlaceHolder 3"/>
           <p:cNvSpPr>
             <a:spLocks noGrp="1"/>
           </p:cNvSpPr>
@@ -184,7 +184,7 @@
       </p:grpSpPr>
       <p:sp>
         <p:nvSpPr>
-          <p:cNvPr id="24" name="PlaceHolder 1"/>
+          <p:cNvPr id="26" name="PlaceHolder 1"/>
           <p:cNvSpPr>
             <a:spLocks noGrp="1"/>
           </p:cNvSpPr>
@@ -221,7 +221,7 @@
       </p:sp>
       <p:sp>
         <p:nvSpPr>
-          <p:cNvPr id="25" name="PlaceHolder 2"/>
+          <p:cNvPr id="27" name="PlaceHolder 2"/>
           <p:cNvSpPr>
             <a:spLocks noGrp="1"/>
           </p:cNvSpPr>
@@ -257,7 +257,7 @@
       </p:sp>
       <p:sp>
         <p:nvSpPr>
-          <p:cNvPr id="26" name="PlaceHolder 3"/>
+          <p:cNvPr id="28" name="PlaceHolder 3"/>
           <p:cNvSpPr>
             <a:spLocks noGrp="1"/>
           </p:cNvSpPr>
@@ -293,7 +293,7 @@
       </p:sp>
       <p:sp>
         <p:nvSpPr>
-          <p:cNvPr id="27" name="PlaceHolder 4"/>
+          <p:cNvPr id="29" name="PlaceHolder 4"/>
           <p:cNvSpPr>
             <a:spLocks noGrp="1"/>
           </p:cNvSpPr>
@@ -329,7 +329,7 @@
       </p:sp>
       <p:sp>
         <p:nvSpPr>
-          <p:cNvPr id="28" name="PlaceHolder 5"/>
+          <p:cNvPr id="30" name="PlaceHolder 5"/>
           <p:cNvSpPr>
             <a:spLocks noGrp="1"/>
           </p:cNvSpPr>
@@ -387,7 +387,7 @@
       </p:grpSpPr>
       <p:sp>
         <p:nvSpPr>
-          <p:cNvPr id="29" name="PlaceHolder 1"/>
+          <p:cNvPr id="31" name="PlaceHolder 1"/>
           <p:cNvSpPr>
             <a:spLocks noGrp="1"/>
           </p:cNvSpPr>
@@ -424,7 +424,7 @@
       </p:sp>
       <p:sp>
         <p:nvSpPr>
-          <p:cNvPr id="30" name="PlaceHolder 2"/>
+          <p:cNvPr id="32" name="PlaceHolder 2"/>
           <p:cNvSpPr>
             <a:spLocks noGrp="1"/>
           </p:cNvSpPr>
@@ -460,7 +460,7 @@
       </p:sp>
       <p:sp>
         <p:nvSpPr>
-          <p:cNvPr id="31" name="PlaceHolder 3"/>
+          <p:cNvPr id="33" name="PlaceHolder 3"/>
           <p:cNvSpPr>
             <a:spLocks noGrp="1"/>
           </p:cNvSpPr>
@@ -496,7 +496,7 @@
       </p:sp>
       <p:pic>
         <p:nvPicPr>
-          <p:cNvPr id="32" name="" descr=""/>
+          <p:cNvPr id="34" name="" descr=""/>
           <p:cNvPicPr/>
           <p:nvPr/>
         </p:nvPicPr>
@@ -519,7 +519,7 @@
       </p:pic>
       <p:pic>
         <p:nvPicPr>
-          <p:cNvPr id="33" name="" descr=""/>
+          <p:cNvPr id="35" name="" descr=""/>
           <p:cNvPicPr/>
           <p:nvPr/>
         </p:nvPicPr>
@@ -564,7 +564,7 @@
       </p:grpSpPr>
       <p:sp>
         <p:nvSpPr>
-          <p:cNvPr id="0" name="PlaceHolder 1"/>
+          <p:cNvPr id="2" name="PlaceHolder 1"/>
           <p:cNvSpPr>
             <a:spLocks noGrp="1"/>
           </p:cNvSpPr>
@@ -601,7 +601,7 @@
       </p:sp>
       <p:sp>
         <p:nvSpPr>
-          <p:cNvPr id="1" name="PlaceHolder 2"/>
+          <p:cNvPr id="3" name="PlaceHolder 2"/>
           <p:cNvSpPr>
             <a:spLocks noGrp="1"/>
           </p:cNvSpPr>
@@ -660,7 +660,7 @@
       </p:grpSpPr>
       <p:sp>
         <p:nvSpPr>
-          <p:cNvPr id="2" name="PlaceHolder 1"/>
+          <p:cNvPr id="4" name="PlaceHolder 1"/>
           <p:cNvSpPr>
             <a:spLocks noGrp="1"/>
           </p:cNvSpPr>
@@ -697,7 +697,7 @@
       </p:sp>
       <p:sp>
         <p:nvSpPr>
-          <p:cNvPr id="3" name="PlaceHolder 2"/>
+          <p:cNvPr id="5" name="PlaceHolder 2"/>
           <p:cNvSpPr>
             <a:spLocks noGrp="1"/>
           </p:cNvSpPr>
@@ -755,7 +755,7 @@
       </p:grpSpPr>
       <p:sp>
         <p:nvSpPr>
-          <p:cNvPr id="4" name="PlaceHolder 1"/>
+          <p:cNvPr id="6" name="PlaceHolder 1"/>
           <p:cNvSpPr>
             <a:spLocks noGrp="1"/>
           </p:cNvSpPr>
@@ -792,7 +792,7 @@
       </p:sp>
       <p:sp>
         <p:nvSpPr>
-          <p:cNvPr id="5" name="PlaceHolder 2"/>
+          <p:cNvPr id="7" name="PlaceHolder 2"/>
           <p:cNvSpPr>
             <a:spLocks noGrp="1"/>
           </p:cNvSpPr>
@@ -828,7 +828,7 @@
       </p:sp>
       <p:sp>
         <p:nvSpPr>
-          <p:cNvPr id="6" name="PlaceHolder 3"/>
+          <p:cNvPr id="8" name="PlaceHolder 3"/>
           <p:cNvSpPr>
             <a:spLocks noGrp="1"/>
           </p:cNvSpPr>
@@ -886,7 +886,7 @@
       </p:grpSpPr>
       <p:sp>
         <p:nvSpPr>
-          <p:cNvPr id="7" name="PlaceHolder 1"/>
+          <p:cNvPr id="9" name="PlaceHolder 1"/>
           <p:cNvSpPr>
             <a:spLocks noGrp="1"/>
           </p:cNvSpPr>
@@ -945,7 +945,7 @@
       </p:grpSpPr>
       <p:sp>
         <p:nvSpPr>
-          <p:cNvPr id="8" name="PlaceHolder 1"/>
+          <p:cNvPr id="10" name="PlaceHolder 1"/>
           <p:cNvSpPr>
             <a:spLocks noGrp="1"/>
           </p:cNvSpPr>
@@ -1004,7 +1004,7 @@
       </p:grpSpPr>
       <p:sp>
         <p:nvSpPr>
-          <p:cNvPr id="9" name="PlaceHolder 1"/>
+          <p:cNvPr id="11" name="PlaceHolder 1"/>
           <p:cNvSpPr>
             <a:spLocks noGrp="1"/>
           </p:cNvSpPr>
@@ -1041,7 +1041,7 @@
       </p:sp>
       <p:sp>
         <p:nvSpPr>
-          <p:cNvPr id="10" name="PlaceHolder 2"/>
+          <p:cNvPr id="12" name="PlaceHolder 2"/>
           <p:cNvSpPr>
             <a:spLocks noGrp="1"/>
           </p:cNvSpPr>
@@ -1077,7 +1077,7 @@
       </p:sp>
       <p:sp>
         <p:nvSpPr>
-          <p:cNvPr id="11" name="PlaceHolder 3"/>
+          <p:cNvPr id="13" name="PlaceHolder 3"/>
           <p:cNvSpPr>
             <a:spLocks noGrp="1"/>
           </p:cNvSpPr>
@@ -1113,7 +1113,7 @@
       </p:sp>
       <p:sp>
         <p:nvSpPr>
-          <p:cNvPr id="12" name="PlaceHolder 4"/>
+          <p:cNvPr id="14" name="PlaceHolder 4"/>
           <p:cNvSpPr>
             <a:spLocks noGrp="1"/>
           </p:cNvSpPr>
@@ -1171,7 +1171,7 @@
       </p:grpSpPr>
       <p:sp>
         <p:nvSpPr>
-          <p:cNvPr id="13" name="PlaceHolder 1"/>
+          <p:cNvPr id="15" name="PlaceHolder 1"/>
           <p:cNvSpPr>
             <a:spLocks noGrp="1"/>
           </p:cNvSpPr>
@@ -1208,7 +1208,7 @@
       </p:sp>
       <p:sp>
         <p:nvSpPr>
-          <p:cNvPr id="14" name="PlaceHolder 2"/>
+          <p:cNvPr id="16" name="PlaceHolder 2"/>
           <p:cNvSpPr>
             <a:spLocks noGrp="1"/>
           </p:cNvSpPr>
@@ -1244,7 +1244,7 @@
       </p:sp>
       <p:sp>
         <p:nvSpPr>
-          <p:cNvPr id="15" name="PlaceHolder 3"/>
+          <p:cNvPr id="17" name="PlaceHolder 3"/>
           <p:cNvSpPr>
             <a:spLocks noGrp="1"/>
           </p:cNvSpPr>
@@ -1280,7 +1280,7 @@
       </p:sp>
       <p:sp>
         <p:nvSpPr>
-          <p:cNvPr id="16" name="PlaceHolder 4"/>
+          <p:cNvPr id="18" name="PlaceHolder 4"/>
           <p:cNvSpPr>
             <a:spLocks noGrp="1"/>
           </p:cNvSpPr>
@@ -1338,7 +1338,7 @@
       </p:grpSpPr>
       <p:sp>
         <p:nvSpPr>
-          <p:cNvPr id="17" name="PlaceHolder 1"/>
+          <p:cNvPr id="19" name="PlaceHolder 1"/>
           <p:cNvSpPr>
             <a:spLocks noGrp="1"/>
           </p:cNvSpPr>
@@ -1375,7 +1375,7 @@
       </p:sp>
       <p:sp>
         <p:nvSpPr>
-          <p:cNvPr id="18" name="PlaceHolder 2"/>
+          <p:cNvPr id="20" name="PlaceHolder 2"/>
           <p:cNvSpPr>
             <a:spLocks noGrp="1"/>
           </p:cNvSpPr>
@@ -1411,7 +1411,7 @@
       </p:sp>
       <p:sp>
         <p:nvSpPr>
-          <p:cNvPr id="19" name="PlaceHolder 3"/>
+          <p:cNvPr id="21" name="PlaceHolder 3"/>
           <p:cNvSpPr>
             <a:spLocks noGrp="1"/>
           </p:cNvSpPr>
@@ -1447,7 +1447,7 @@
       </p:sp>
       <p:sp>
         <p:nvSpPr>
-          <p:cNvPr id="20" name="PlaceHolder 4"/>
+          <p:cNvPr id="22" name="PlaceHolder 4"/>
           <p:cNvSpPr>
             <a:spLocks noGrp="1"/>
           </p:cNvSpPr>
@@ -1510,6 +1510,325 @@
           <a:chExt cx="0" cy="0"/>
         </a:xfrm>
       </p:grpSpPr>
+      <p:sp>
+        <p:nvSpPr>
+          <p:cNvPr id="0" name="PlaceHolder 1"/>
+          <p:cNvSpPr>
+            <a:spLocks noGrp="1"/>
+          </p:cNvSpPr>
+          <p:nvPr>
+            <p:ph type="title"/>
+          </p:nvPr>
+        </p:nvSpPr>
+        <p:spPr>
+          <a:xfrm>
+            <a:off x="1513440" y="1707840"/>
+            <a:ext cx="27247320" cy="7148880"/>
+          </a:xfrm>
+          <a:prstGeom prst="rect">
+            <a:avLst/>
+          </a:prstGeom>
+        </p:spPr>
+        <p:txBody>
+          <a:bodyPr lIns="0" rIns="0" tIns="0" bIns="0" anchor="ctr"/>
+          <a:p>
+            <a:pPr algn="ctr"/>
+            <a:r>
+              <a:rPr b="0" lang="en-US" sz="4400" spc="-1" strike="noStrike">
+                <a:solidFill>
+                  <a:srgbClr val="000000"/>
+                </a:solidFill>
+                <a:uFill>
+                  <a:solidFill>
+                    <a:srgbClr val="ffffff"/>
+                  </a:solidFill>
+                </a:uFill>
+                <a:latin typeface="Arial"/>
+              </a:rPr>
+              <a:t>Click to edit the title text format</a:t>
+            </a:r>
+            <a:endParaRPr b="0" lang="en-US" sz="4400" spc="-1" strike="noStrike">
+              <a:solidFill>
+                <a:srgbClr val="000000"/>
+              </a:solidFill>
+              <a:uFill>
+                <a:solidFill>
+                  <a:srgbClr val="ffffff"/>
+                </a:solidFill>
+              </a:uFill>
+              <a:latin typeface="Arial"/>
+            </a:endParaRPr>
+          </a:p>
+        </p:txBody>
+      </p:sp>
+      <p:sp>
+        <p:nvSpPr>
+          <p:cNvPr id="1" name="PlaceHolder 2"/>
+          <p:cNvSpPr>
+            <a:spLocks noGrp="1"/>
+          </p:cNvSpPr>
+          <p:nvPr>
+            <p:ph type="body"/>
+          </p:nvPr>
+        </p:nvSpPr>
+        <p:spPr>
+          <a:xfrm>
+            <a:off x="1513440" y="10017720"/>
+            <a:ext cx="27247320" cy="24830280"/>
+          </a:xfrm>
+          <a:prstGeom prst="rect">
+            <a:avLst/>
+          </a:prstGeom>
+        </p:spPr>
+        <p:txBody>
+          <a:bodyPr lIns="0" rIns="0" tIns="0" bIns="0"/>
+          <a:p>
+            <a:pPr marL="432000" indent="-324000">
+              <a:buClr>
+                <a:srgbClr val="000000"/>
+              </a:buClr>
+              <a:buSzPct val="45000"/>
+              <a:buFont typeface="Wingdings" charset="2"/>
+              <a:buChar char=""/>
+            </a:pPr>
+            <a:r>
+              <a:rPr b="0" lang="en-US" sz="3200" spc="-1" strike="noStrike">
+                <a:solidFill>
+                  <a:srgbClr val="000000"/>
+                </a:solidFill>
+                <a:uFill>
+                  <a:solidFill>
+                    <a:srgbClr val="ffffff"/>
+                  </a:solidFill>
+                </a:uFill>
+                <a:latin typeface="Arial"/>
+              </a:rPr>
+              <a:t>Click to edit the outline text format</a:t>
+            </a:r>
+            <a:endParaRPr b="0" lang="en-US" sz="3200" spc="-1" strike="noStrike">
+              <a:solidFill>
+                <a:srgbClr val="000000"/>
+              </a:solidFill>
+              <a:uFill>
+                <a:solidFill>
+                  <a:srgbClr val="ffffff"/>
+                </a:solidFill>
+              </a:uFill>
+              <a:latin typeface="Arial"/>
+            </a:endParaRPr>
+          </a:p>
+          <a:p>
+            <a:pPr lvl="1" marL="864000" indent="-324000">
+              <a:buClr>
+                <a:srgbClr val="000000"/>
+              </a:buClr>
+              <a:buSzPct val="75000"/>
+              <a:buFont typeface="Symbol" charset="2"/>
+              <a:buChar char=""/>
+            </a:pPr>
+            <a:r>
+              <a:rPr b="0" lang="en-US" sz="2800" spc="-1" strike="noStrike">
+                <a:solidFill>
+                  <a:srgbClr val="000000"/>
+                </a:solidFill>
+                <a:uFill>
+                  <a:solidFill>
+                    <a:srgbClr val="ffffff"/>
+                  </a:solidFill>
+                </a:uFill>
+                <a:latin typeface="Arial"/>
+              </a:rPr>
+              <a:t>Second Outline Level</a:t>
+            </a:r>
+            <a:endParaRPr b="0" lang="en-US" sz="2800" spc="-1" strike="noStrike">
+              <a:solidFill>
+                <a:srgbClr val="000000"/>
+              </a:solidFill>
+              <a:uFill>
+                <a:solidFill>
+                  <a:srgbClr val="ffffff"/>
+                </a:solidFill>
+              </a:uFill>
+              <a:latin typeface="Arial"/>
+            </a:endParaRPr>
+          </a:p>
+          <a:p>
+            <a:pPr lvl="2" marL="1296000" indent="-288000">
+              <a:buClr>
+                <a:srgbClr val="000000"/>
+              </a:buClr>
+              <a:buSzPct val="45000"/>
+              <a:buFont typeface="Wingdings" charset="2"/>
+              <a:buChar char=""/>
+            </a:pPr>
+            <a:r>
+              <a:rPr b="0" lang="en-US" sz="2400" spc="-1" strike="noStrike">
+                <a:solidFill>
+                  <a:srgbClr val="000000"/>
+                </a:solidFill>
+                <a:uFill>
+                  <a:solidFill>
+                    <a:srgbClr val="ffffff"/>
+                  </a:solidFill>
+                </a:uFill>
+                <a:latin typeface="Arial"/>
+              </a:rPr>
+              <a:t>Third Outline Level</a:t>
+            </a:r>
+            <a:endParaRPr b="0" lang="en-US" sz="2400" spc="-1" strike="noStrike">
+              <a:solidFill>
+                <a:srgbClr val="000000"/>
+              </a:solidFill>
+              <a:uFill>
+                <a:solidFill>
+                  <a:srgbClr val="ffffff"/>
+                </a:solidFill>
+              </a:uFill>
+              <a:latin typeface="Arial"/>
+            </a:endParaRPr>
+          </a:p>
+          <a:p>
+            <a:pPr lvl="3" marL="1728000" indent="-216000">
+              <a:buClr>
+                <a:srgbClr val="000000"/>
+              </a:buClr>
+              <a:buSzPct val="75000"/>
+              <a:buFont typeface="Symbol" charset="2"/>
+              <a:buChar char=""/>
+            </a:pPr>
+            <a:r>
+              <a:rPr b="0" lang="en-US" sz="2000" spc="-1" strike="noStrike">
+                <a:solidFill>
+                  <a:srgbClr val="000000"/>
+                </a:solidFill>
+                <a:uFill>
+                  <a:solidFill>
+                    <a:srgbClr val="ffffff"/>
+                  </a:solidFill>
+                </a:uFill>
+                <a:latin typeface="Arial"/>
+              </a:rPr>
+              <a:t>Fourth Outline Level</a:t>
+            </a:r>
+            <a:endParaRPr b="0" lang="en-US" sz="2000" spc="-1" strike="noStrike">
+              <a:solidFill>
+                <a:srgbClr val="000000"/>
+              </a:solidFill>
+              <a:uFill>
+                <a:solidFill>
+                  <a:srgbClr val="ffffff"/>
+                </a:solidFill>
+              </a:uFill>
+              <a:latin typeface="Arial"/>
+            </a:endParaRPr>
+          </a:p>
+          <a:p>
+            <a:pPr lvl="4" marL="2160000" indent="-216000">
+              <a:buClr>
+                <a:srgbClr val="000000"/>
+              </a:buClr>
+              <a:buSzPct val="45000"/>
+              <a:buFont typeface="Wingdings" charset="2"/>
+              <a:buChar char=""/>
+            </a:pPr>
+            <a:r>
+              <a:rPr b="0" lang="en-US" sz="2000" spc="-1" strike="noStrike">
+                <a:solidFill>
+                  <a:srgbClr val="000000"/>
+                </a:solidFill>
+                <a:uFill>
+                  <a:solidFill>
+                    <a:srgbClr val="ffffff"/>
+                  </a:solidFill>
+                </a:uFill>
+                <a:latin typeface="Arial"/>
+              </a:rPr>
+              <a:t>Fifth Outline Level</a:t>
+            </a:r>
+            <a:endParaRPr b="0" lang="en-US" sz="2000" spc="-1" strike="noStrike">
+              <a:solidFill>
+                <a:srgbClr val="000000"/>
+              </a:solidFill>
+              <a:uFill>
+                <a:solidFill>
+                  <a:srgbClr val="ffffff"/>
+                </a:solidFill>
+              </a:uFill>
+              <a:latin typeface="Arial"/>
+            </a:endParaRPr>
+          </a:p>
+          <a:p>
+            <a:pPr lvl="5" marL="2592000" indent="-216000">
+              <a:buClr>
+                <a:srgbClr val="000000"/>
+              </a:buClr>
+              <a:buSzPct val="45000"/>
+              <a:buFont typeface="Wingdings" charset="2"/>
+              <a:buChar char=""/>
+            </a:pPr>
+            <a:r>
+              <a:rPr b="0" lang="en-US" sz="2000" spc="-1" strike="noStrike">
+                <a:solidFill>
+                  <a:srgbClr val="000000"/>
+                </a:solidFill>
+                <a:uFill>
+                  <a:solidFill>
+                    <a:srgbClr val="ffffff"/>
+                  </a:solidFill>
+                </a:uFill>
+                <a:latin typeface="Arial"/>
+              </a:rPr>
+              <a:t>Sixth Outline Level</a:t>
+            </a:r>
+            <a:endParaRPr b="0" lang="en-US" sz="2000" spc="-1" strike="noStrike">
+              <a:solidFill>
+                <a:srgbClr val="000000"/>
+              </a:solidFill>
+              <a:uFill>
+                <a:solidFill>
+                  <a:srgbClr val="ffffff"/>
+                </a:solidFill>
+              </a:uFill>
+              <a:latin typeface="Arial"/>
+            </a:endParaRPr>
+          </a:p>
+          <a:p>
+            <a:pPr lvl="6" marL="3024000" indent="-216000">
+              <a:buClr>
+                <a:srgbClr val="000000"/>
+              </a:buClr>
+              <a:buSzPct val="45000"/>
+              <a:buFont typeface="Wingdings" charset="2"/>
+              <a:buChar char=""/>
+            </a:pPr>
+            <a:r>
+              <a:rPr b="0" lang="en-US" sz="2000" spc="-1" strike="noStrike">
+                <a:solidFill>
+                  <a:srgbClr val="000000"/>
+                </a:solidFill>
+                <a:uFill>
+                  <a:solidFill>
+                    <a:srgbClr val="ffffff"/>
+                  </a:solidFill>
+                </a:uFill>
+                <a:latin typeface="Arial"/>
+              </a:rPr>
+              <a:t>Seventh Outline Level</a:t>
+            </a:r>
+            <a:endParaRPr b="0" lang="en-US" sz="2000" spc="-1" strike="noStrike">
+              <a:solidFill>
+                <a:srgbClr val="000000"/>
+              </a:solidFill>
+              <a:uFill>
+                <a:solidFill>
+                  <a:srgbClr val="ffffff"/>
+                </a:solidFill>
+              </a:uFill>
+              <a:latin typeface="Arial"/>
+            </a:endParaRPr>
+          </a:p>
+        </p:txBody>
+      </p:sp>
     </p:spTree>
   </p:cSld>
   <p:clrMap bg1="lt1" bg2="lt2" tx1="dk1" tx2="dk2" accent1="accent1" accent2="accent2" accent3="accent3" accent4="accent4" accent5="accent5" accent6="accent6" hlink="hlink" folHlink="folHlink"/>
@@ -1549,7 +1868,7 @@
       </p:grpSpPr>
       <p:sp>
         <p:nvSpPr>
-          <p:cNvPr id="34" name="CustomShape 1"/>
+          <p:cNvPr id="36" name="CustomShape 1"/>
           <p:cNvSpPr/>
           <p:nvPr/>
         </p:nvSpPr>
@@ -1601,7 +1920,7 @@
       </p:sp>
       <p:pic>
         <p:nvPicPr>
-          <p:cNvPr id="35" name="Grafik 8" descr=""/>
+          <p:cNvPr id="37" name="Grafik 8" descr=""/>
           <p:cNvPicPr/>
           <p:nvPr/>
         </p:nvPicPr>
@@ -1624,7 +1943,7 @@
       </p:pic>
       <p:sp>
         <p:nvSpPr>
-          <p:cNvPr id="36" name="CustomShape 2"/>
+          <p:cNvPr id="38" name="CustomShape 2"/>
           <p:cNvSpPr/>
           <p:nvPr/>
         </p:nvSpPr>
@@ -1668,7 +1987,7 @@
       </p:sp>
       <p:sp>
         <p:nvSpPr>
-          <p:cNvPr id="37" name="CustomShape 3"/>
+          <p:cNvPr id="39" name="CustomShape 3"/>
           <p:cNvSpPr/>
           <p:nvPr/>
         </p:nvSpPr>
@@ -1745,7 +2064,7 @@
       </p:sp>
       <p:sp>
         <p:nvSpPr>
-          <p:cNvPr id="38" name="CustomShape 4"/>
+          <p:cNvPr id="40" name="CustomShape 4"/>
           <p:cNvSpPr/>
           <p:nvPr/>
         </p:nvSpPr>
@@ -1789,7 +2108,7 @@
       </p:sp>
       <p:sp>
         <p:nvSpPr>
-          <p:cNvPr id="39" name="CustomShape 5"/>
+          <p:cNvPr id="41" name="CustomShape 5"/>
           <p:cNvSpPr/>
           <p:nvPr/>
         </p:nvSpPr>
@@ -1815,7 +2134,7 @@
       </p:sp>
       <p:pic>
         <p:nvPicPr>
-          <p:cNvPr id="40" name="Grafik 62" descr=""/>
+          <p:cNvPr id="42" name="Grafik 62" descr=""/>
           <p:cNvPicPr/>
           <p:nvPr/>
         </p:nvPicPr>
@@ -1838,7 +2157,7 @@
       </p:pic>
       <p:sp>
         <p:nvSpPr>
-          <p:cNvPr id="41" name="Line 6"/>
+          <p:cNvPr id="43" name="Line 6"/>
           <p:cNvSpPr/>
           <p:nvPr/>
         </p:nvSpPr>
@@ -1872,7 +2191,7 @@
       </p:sp>
       <p:sp>
         <p:nvSpPr>
-          <p:cNvPr id="42" name="CustomShape 7"/>
+          <p:cNvPr id="44" name="CustomShape 7"/>
           <p:cNvSpPr/>
           <p:nvPr/>
         </p:nvSpPr>
@@ -1934,7 +2253,7 @@
       </p:sp>
       <p:sp>
         <p:nvSpPr>
-          <p:cNvPr id="43" name="CustomShape 8"/>
+          <p:cNvPr id="45" name="CustomShape 8"/>
           <p:cNvSpPr/>
           <p:nvPr/>
         </p:nvSpPr>
@@ -2062,7 +2381,7 @@
       </p:sp>
       <p:sp>
         <p:nvSpPr>
-          <p:cNvPr id="44" name="CustomShape 9"/>
+          <p:cNvPr id="46" name="CustomShape 9"/>
           <p:cNvSpPr/>
           <p:nvPr/>
         </p:nvSpPr>
@@ -2157,7 +2476,7 @@
       </p:sp>
       <p:sp>
         <p:nvSpPr>
-          <p:cNvPr id="45" name="CustomShape 10"/>
+          <p:cNvPr id="47" name="CustomShape 10"/>
           <p:cNvSpPr/>
           <p:nvPr/>
         </p:nvSpPr>
@@ -2219,7 +2538,7 @@
       </p:sp>
       <p:pic>
         <p:nvPicPr>
-          <p:cNvPr id="46" name="Bild 1" descr=""/>
+          <p:cNvPr id="48" name="Bild 1" descr=""/>
           <p:cNvPicPr/>
           <p:nvPr/>
         </p:nvPicPr>
@@ -2242,7 +2561,7 @@
       </p:pic>
       <p:sp>
         <p:nvSpPr>
-          <p:cNvPr id="47" name="CustomShape 11"/>
+          <p:cNvPr id="49" name="CustomShape 11"/>
           <p:cNvSpPr/>
           <p:nvPr/>
         </p:nvSpPr>
@@ -2304,7 +2623,7 @@
       </p:sp>
       <p:sp>
         <p:nvSpPr>
-          <p:cNvPr id="48" name="CustomShape 12"/>
+          <p:cNvPr id="50" name="CustomShape 12"/>
           <p:cNvSpPr/>
           <p:nvPr/>
         </p:nvSpPr>
@@ -2368,13 +2687,13 @@
       </p:sp>
       <p:sp>
         <p:nvSpPr>
-          <p:cNvPr id="49" name="CustomShape 13"/>
+          <p:cNvPr id="51" name="CustomShape 13"/>
           <p:cNvSpPr/>
           <p:nvPr/>
         </p:nvSpPr>
         <p:spPr>
           <a:xfrm>
-            <a:off x="16595280" y="22852440"/>
+            <a:off x="16550640" y="24508080"/>
             <a:ext cx="12598560" cy="1003680"/>
           </a:xfrm>
           <a:prstGeom prst="rect">
@@ -2414,7 +2733,7 @@
                 <a:latin typeface="Arial"/>
                 <a:ea typeface="DejaVu Sans"/>
               </a:rPr>
-              <a:t>de. NBI training and education</a:t>
+              <a:t>de.NBI training and education</a:t>
             </a:r>
             <a:endParaRPr b="0" lang="en-US" sz="1800" spc="-1" strike="noStrike">
               <a:solidFill>
@@ -2432,7 +2751,7 @@
       </p:sp>
       <p:sp>
         <p:nvSpPr>
-          <p:cNvPr id="50" name="CustomShape 14"/>
+          <p:cNvPr id="52" name="CustomShape 14"/>
           <p:cNvSpPr/>
           <p:nvPr/>
         </p:nvSpPr>
@@ -2496,7 +2815,7 @@
       </p:sp>
       <p:sp>
         <p:nvSpPr>
-          <p:cNvPr id="51" name="CustomShape 15"/>
+          <p:cNvPr id="53" name="CustomShape 15"/>
           <p:cNvSpPr/>
           <p:nvPr/>
         </p:nvSpPr>
@@ -2560,7 +2879,7 @@
       </p:sp>
       <p:sp>
         <p:nvSpPr>
-          <p:cNvPr id="52" name="CustomShape 16"/>
+          <p:cNvPr id="54" name="CustomShape 16"/>
           <p:cNvSpPr/>
           <p:nvPr/>
         </p:nvSpPr>
@@ -2622,7 +2941,7 @@
       </p:sp>
       <p:sp>
         <p:nvSpPr>
-          <p:cNvPr id="53" name="CustomShape 17"/>
+          <p:cNvPr id="55" name="CustomShape 17"/>
           <p:cNvSpPr/>
           <p:nvPr/>
         </p:nvSpPr>
@@ -2684,7 +3003,7 @@
       </p:sp>
       <p:pic>
         <p:nvPicPr>
-          <p:cNvPr id="54" name="Grafik 6" descr=""/>
+          <p:cNvPr id="56" name="Grafik 6" descr=""/>
           <p:cNvPicPr/>
           <p:nvPr/>
         </p:nvPicPr>
@@ -2707,7 +3026,7 @@
       </p:pic>
       <p:sp>
         <p:nvSpPr>
-          <p:cNvPr id="55" name="CustomShape 18"/>
+          <p:cNvPr id="57" name="CustomShape 18"/>
           <p:cNvSpPr/>
           <p:nvPr/>
         </p:nvSpPr>
@@ -2786,7 +3105,7 @@
       </p:sp>
       <p:pic>
         <p:nvPicPr>
-          <p:cNvPr id="56" name="Grafik 3" descr=""/>
+          <p:cNvPr id="58" name="Grafik 3" descr=""/>
           <p:cNvPicPr/>
           <p:nvPr/>
         </p:nvPicPr>
@@ -2809,7 +3128,7 @@
       </p:pic>
       <p:pic>
         <p:nvPicPr>
-          <p:cNvPr id="57" name="Grafik 14" descr=""/>
+          <p:cNvPr id="59" name="Grafik 14" descr=""/>
           <p:cNvPicPr/>
           <p:nvPr/>
         </p:nvPicPr>
@@ -2832,7 +3151,7 @@
       </p:pic>
       <p:sp>
         <p:nvSpPr>
-          <p:cNvPr id="58" name="CustomShape 19"/>
+          <p:cNvPr id="60" name="CustomShape 19"/>
           <p:cNvSpPr/>
           <p:nvPr/>
         </p:nvSpPr>
@@ -2858,7 +3177,7 @@
       </p:sp>
       <p:sp>
         <p:nvSpPr>
-          <p:cNvPr id="59" name="CustomShape 20"/>
+          <p:cNvPr id="61" name="CustomShape 20"/>
           <p:cNvSpPr/>
           <p:nvPr/>
         </p:nvSpPr>
@@ -3005,7 +3324,7 @@
       </p:sp>
       <p:pic>
         <p:nvPicPr>
-          <p:cNvPr id="60" name="Grafik 70" descr=""/>
+          <p:cNvPr id="62" name="Grafik 70" descr=""/>
           <p:cNvPicPr/>
           <p:nvPr/>
         </p:nvPicPr>
@@ -3028,7 +3347,7 @@
       </p:pic>
       <p:pic>
         <p:nvPicPr>
-          <p:cNvPr id="61" name="Grafik 59" descr=""/>
+          <p:cNvPr id="63" name="Grafik 59" descr=""/>
           <p:cNvPicPr/>
           <p:nvPr/>
         </p:nvPicPr>
@@ -3051,7 +3370,7 @@
       </p:pic>
       <p:pic>
         <p:nvPicPr>
-          <p:cNvPr id="62" name="Grafik 58" descr=""/>
+          <p:cNvPr id="64" name="Grafik 58" descr=""/>
           <p:cNvPicPr/>
           <p:nvPr/>
         </p:nvPicPr>
@@ -3063,52 +3382,6 @@
           <a:xfrm>
             <a:off x="26007480" y="763920"/>
             <a:ext cx="3787920" cy="1644120"/>
-          </a:xfrm>
-          <a:prstGeom prst="rect">
-            <a:avLst/>
-          </a:prstGeom>
-          <a:ln>
-            <a:noFill/>
-          </a:ln>
-        </p:spPr>
-      </p:pic>
-      <p:pic>
-        <p:nvPicPr>
-          <p:cNvPr id="63" name="" descr=""/>
-          <p:cNvPicPr/>
-          <p:nvPr/>
-        </p:nvPicPr>
-        <p:blipFill>
-          <a:blip r:embed="rId11"/>
-          <a:stretch/>
-        </p:blipFill>
-        <p:spPr>
-          <a:xfrm>
-            <a:off x="5699160" y="26243280"/>
-            <a:ext cx="3810240" cy="822600"/>
-          </a:xfrm>
-          <a:prstGeom prst="rect">
-            <a:avLst/>
-          </a:prstGeom>
-          <a:ln>
-            <a:noFill/>
-          </a:ln>
-        </p:spPr>
-      </p:pic>
-      <p:pic>
-        <p:nvPicPr>
-          <p:cNvPr id="64" name="" descr=""/>
-          <p:cNvPicPr/>
-          <p:nvPr/>
-        </p:nvPicPr>
-        <p:blipFill>
-          <a:blip r:embed="rId12"/>
-          <a:stretch/>
-        </p:blipFill>
-        <p:spPr>
-          <a:xfrm>
-            <a:off x="1306080" y="26391600"/>
-            <a:ext cx="3374280" cy="548280"/>
           </a:xfrm>
           <a:prstGeom prst="rect">
             <a:avLst/>
@@ -3125,13 +3398,13 @@
           <p:nvPr/>
         </p:nvPicPr>
         <p:blipFill>
-          <a:blip r:embed="rId13"/>
+          <a:blip r:embed="rId11"/>
           <a:stretch/>
         </p:blipFill>
         <p:spPr>
           <a:xfrm>
-            <a:off x="23134320" y="13180680"/>
-            <a:ext cx="5760360" cy="4009680"/>
+            <a:off x="5699160" y="26243280"/>
+            <a:ext cx="3810240" cy="822600"/>
           </a:xfrm>
           <a:prstGeom prst="rect">
             <a:avLst/>
@@ -3148,13 +3421,59 @@
           <p:nvPr/>
         </p:nvPicPr>
         <p:blipFill>
+          <a:blip r:embed="rId12"/>
+          <a:stretch/>
+        </p:blipFill>
+        <p:spPr>
+          <a:xfrm>
+            <a:off x="1306080" y="26391600"/>
+            <a:ext cx="3374280" cy="548280"/>
+          </a:xfrm>
+          <a:prstGeom prst="rect">
+            <a:avLst/>
+          </a:prstGeom>
+          <a:ln>
+            <a:noFill/>
+          </a:ln>
+        </p:spPr>
+      </p:pic>
+      <p:pic>
+        <p:nvPicPr>
+          <p:cNvPr id="67" name="" descr=""/>
+          <p:cNvPicPr/>
+          <p:nvPr/>
+        </p:nvPicPr>
+        <p:blipFill>
+          <a:blip r:embed="rId13"/>
+          <a:stretch/>
+        </p:blipFill>
+        <p:spPr>
+          <a:xfrm>
+            <a:off x="21945960" y="12480840"/>
+            <a:ext cx="6034680" cy="4200840"/>
+          </a:xfrm>
+          <a:prstGeom prst="rect">
+            <a:avLst/>
+          </a:prstGeom>
+          <a:ln>
+            <a:noFill/>
+          </a:ln>
+        </p:spPr>
+      </p:pic>
+      <p:pic>
+        <p:nvPicPr>
+          <p:cNvPr id="68" name="" descr=""/>
+          <p:cNvPicPr/>
+          <p:nvPr/>
+        </p:nvPicPr>
+        <p:blipFill>
           <a:blip r:embed="rId14"/>
           <a:stretch/>
         </p:blipFill>
         <p:spPr>
           <a:xfrm>
-            <a:off x="2377800" y="15899040"/>
-            <a:ext cx="8046000" cy="5468760"/>
+            <a:off x="16435080" y="18470880"/>
+            <a:ext cx="5784840" cy="3931920"/>
           </a:xfrm>
           <a:prstGeom prst="rect">
             <a:avLst/>
@@ -3166,13 +3485,13 @@
       </p:pic>
       <p:sp>
         <p:nvSpPr>
-          <p:cNvPr id="67" name="CustomShape 21"/>
+          <p:cNvPr id="69" name="CustomShape 21"/>
           <p:cNvSpPr/>
           <p:nvPr/>
         </p:nvSpPr>
         <p:spPr>
           <a:xfrm>
-            <a:off x="16733520" y="24545520"/>
+            <a:off x="16550640" y="26700480"/>
             <a:ext cx="12103920" cy="5446440"/>
           </a:xfrm>
           <a:prstGeom prst="rect">
@@ -3309,7 +3628,7 @@
       </p:sp>
       <p:sp>
         <p:nvSpPr>
-          <p:cNvPr id="68" name="CustomShape 22"/>
+          <p:cNvPr id="70" name="CustomShape 22"/>
           <p:cNvSpPr/>
           <p:nvPr/>
         </p:nvSpPr>
@@ -3613,11 +3932,100 @@
               <a:latin typeface="Arial"/>
             </a:endParaRPr>
           </a:p>
+          <a:p>
+            <a:pPr marL="216000" indent="-214920">
+              <a:lnSpc>
+                <a:spcPct val="115000"/>
+              </a:lnSpc>
+              <a:buClr>
+                <a:srgbClr val="000000"/>
+              </a:buClr>
+              <a:buFont typeface="Symbol"/>
+              <a:buChar char=""/>
+            </a:pPr>
+            <a:r>
+              <a:rPr b="0" lang="en-US" sz="3200" spc="-1" strike="noStrike">
+                <a:solidFill>
+                  <a:srgbClr val="000000"/>
+                </a:solidFill>
+                <a:uFill>
+                  <a:solidFill>
+                    <a:srgbClr val="ffffff"/>
+                  </a:solidFill>
+                </a:uFill>
+                <a:latin typeface="Arial"/>
+                <a:ea typeface="DejaVu Sans"/>
+              </a:rPr>
+              <a:t> </a:t>
+            </a:r>
+            <a:endParaRPr b="0" lang="en-US" sz="1800" spc="-1" strike="noStrike">
+              <a:solidFill>
+                <a:srgbClr val="000000"/>
+              </a:solidFill>
+              <a:uFill>
+                <a:solidFill>
+                  <a:srgbClr val="ffffff"/>
+                </a:solidFill>
+              </a:uFill>
+              <a:latin typeface="Arial"/>
+            </a:endParaRPr>
+          </a:p>
+          <a:p>
+            <a:pPr>
+              <a:lnSpc>
+                <a:spcPct val="115000"/>
+              </a:lnSpc>
+            </a:pPr>
+            <a:endParaRPr b="0" lang="en-US" sz="1800" spc="-1" strike="noStrike">
+              <a:solidFill>
+                <a:srgbClr val="000000"/>
+              </a:solidFill>
+              <a:uFill>
+                <a:solidFill>
+                  <a:srgbClr val="ffffff"/>
+                </a:solidFill>
+              </a:uFill>
+              <a:latin typeface="Arial"/>
+            </a:endParaRPr>
+          </a:p>
+          <a:p>
+            <a:pPr>
+              <a:lnSpc>
+                <a:spcPct val="115000"/>
+              </a:lnSpc>
+            </a:pPr>
+            <a:r>
+              <a:rPr b="0" lang="en-US" sz="3200" spc="-1" strike="noStrike">
+                <a:solidFill>
+                  <a:srgbClr val="000000"/>
+                </a:solidFill>
+                <a:uFill>
+                  <a:solidFill>
+                    <a:srgbClr val="ffffff"/>
+                  </a:solidFill>
+                </a:uFill>
+                <a:latin typeface="Arial"/>
+                <a:ea typeface="DejaVu Sans"/>
+              </a:rPr>
+              <a:t>Developed a plugin system for Galaxy:</a:t>
+            </a:r>
+            <a:endParaRPr b="0" lang="en-US" sz="1800" spc="-1" strike="noStrike">
+              <a:solidFill>
+                <a:srgbClr val="000000"/>
+              </a:solidFill>
+              <a:uFill>
+                <a:solidFill>
+                  <a:srgbClr val="ffffff"/>
+                </a:solidFill>
+              </a:uFill>
+              <a:latin typeface="Arial"/>
+            </a:endParaRPr>
+          </a:p>
         </p:txBody>
       </p:sp>
       <p:pic>
         <p:nvPicPr>
-          <p:cNvPr id="69" name="" descr=""/>
+          <p:cNvPr id="71" name="" descr=""/>
           <p:cNvPicPr/>
           <p:nvPr/>
         </p:nvPicPr>
@@ -3640,7 +4048,7 @@
       </p:pic>
       <p:sp>
         <p:nvSpPr>
-          <p:cNvPr id="70" name="CustomShape 23"/>
+          <p:cNvPr id="72" name="CustomShape 23"/>
           <p:cNvSpPr/>
           <p:nvPr/>
         </p:nvSpPr>
@@ -3815,7 +4223,7 @@
       </p:sp>
       <p:sp>
         <p:nvSpPr>
-          <p:cNvPr id="71" name="CustomShape 24"/>
+          <p:cNvPr id="73" name="CustomShape 24"/>
           <p:cNvSpPr/>
           <p:nvPr/>
         </p:nvSpPr>
@@ -4008,7 +4416,7 @@
       </p:sp>
       <p:sp>
         <p:nvSpPr>
-          <p:cNvPr id="72" name="CustomShape 25"/>
+          <p:cNvPr id="74" name="CustomShape 25"/>
           <p:cNvSpPr/>
           <p:nvPr/>
         </p:nvSpPr>
@@ -4166,6 +4574,129 @@
                 <a:latin typeface="Arial"/>
               </a:rPr>
               <a:t>Our own galaxy instance is the biggest in Europe: http://galaxy.uni-freiburg.de/</a:t>
+            </a:r>
+            <a:endParaRPr b="0" lang="en-US" sz="1800" spc="-1" strike="noStrike">
+              <a:solidFill>
+                <a:srgbClr val="000000"/>
+              </a:solidFill>
+              <a:uFill>
+                <a:solidFill>
+                  <a:srgbClr val="ffffff"/>
+                </a:solidFill>
+              </a:uFill>
+              <a:latin typeface="Arial"/>
+            </a:endParaRPr>
+          </a:p>
+        </p:txBody>
+      </p:sp>
+      <p:pic>
+        <p:nvPicPr>
+          <p:cNvPr id="75" name="" descr=""/>
+          <p:cNvPicPr/>
+          <p:nvPr/>
+        </p:nvPicPr>
+        <p:blipFill>
+          <a:blip r:embed="rId16"/>
+          <a:stretch/>
+        </p:blipFill>
+        <p:spPr>
+          <a:xfrm>
+            <a:off x="23408640" y="18288000"/>
+            <a:ext cx="5394960" cy="4073400"/>
+          </a:xfrm>
+          <a:prstGeom prst="rect">
+            <a:avLst/>
+          </a:prstGeom>
+          <a:ln>
+            <a:noFill/>
+          </a:ln>
+        </p:spPr>
+      </p:pic>
+      <p:sp>
+        <p:nvSpPr>
+          <p:cNvPr id="76" name="TextShape 26"/>
+          <p:cNvSpPr txBox="1"/>
+          <p:nvPr/>
+        </p:nvSpPr>
+        <p:spPr>
+          <a:xfrm>
+            <a:off x="16642080" y="22402800"/>
+            <a:ext cx="5303520" cy="858240"/>
+          </a:xfrm>
+          <a:prstGeom prst="rect">
+            <a:avLst/>
+          </a:prstGeom>
+          <a:noFill/>
+          <a:ln>
+            <a:noFill/>
+          </a:ln>
+        </p:spPr>
+        <p:txBody>
+          <a:bodyPr lIns="90000" rIns="90000" tIns="45000" bIns="45000"/>
+          <a:p>
+            <a:r>
+              <a:rPr b="0" lang="en-US" sz="1800" spc="-1" strike="noStrike">
+                <a:solidFill>
+                  <a:srgbClr val="000000"/>
+                </a:solidFill>
+                <a:uFill>
+                  <a:solidFill>
+                    <a:srgbClr val="ffffff"/>
+                  </a:solidFill>
+                </a:uFill>
+                <a:latin typeface="Arial"/>
+              </a:rPr>
+              <a:t>Pricing system: How much would it cost to compute and store your data on Amazon EC2?</a:t>
+            </a:r>
+            <a:endParaRPr b="0" lang="en-US" sz="1800" spc="-1" strike="noStrike">
+              <a:solidFill>
+                <a:srgbClr val="000000"/>
+              </a:solidFill>
+              <a:uFill>
+                <a:solidFill>
+                  <a:srgbClr val="ffffff"/>
+                </a:solidFill>
+              </a:uFill>
+              <a:latin typeface="Arial"/>
+            </a:endParaRPr>
+          </a:p>
+        </p:txBody>
+      </p:sp>
+      <p:sp>
+        <p:nvSpPr>
+          <p:cNvPr id="77" name="TextShape 27"/>
+          <p:cNvSpPr txBox="1"/>
+          <p:nvPr/>
+        </p:nvSpPr>
+        <p:spPr>
+          <a:xfrm>
+            <a:off x="23225760" y="22367520"/>
+            <a:ext cx="5943600" cy="858240"/>
+          </a:xfrm>
+          <a:prstGeom prst="rect">
+            <a:avLst/>
+          </a:prstGeom>
+          <a:noFill/>
+          <a:ln>
+            <a:noFill/>
+          </a:ln>
+        </p:spPr>
+        <p:txBody>
+          <a:bodyPr lIns="90000" rIns="90000" tIns="45000" bIns="45000"/>
+          <a:p>
+            <a:r>
+              <a:rPr b="0" lang="en-US" sz="1800" spc="-1" strike="noStrike">
+                <a:solidFill>
+                  <a:srgbClr val="000000"/>
+                </a:solidFill>
+                <a:uFill>
+                  <a:solidFill>
+                    <a:srgbClr val="ffffff"/>
+                  </a:solidFill>
+                </a:uFill>
+                <a:latin typeface="Arial"/>
+              </a:rPr>
+              <a:t>Comics: Have fun while Galaxy is computing your data.</a:t>
             </a:r>
             <a:endParaRPr b="0" lang="en-US" sz="1800" spc="-1" strike="noStrike">
               <a:solidFill>

</xml_diff>

<commit_message>
Added master plan image
</commit_message>
<xml_diff>
--- a/rbc_sab-berlin_2016/Poster_deNBI-epi_SAB-Meeting_2016.pptx
+++ b/rbc_sab-berlin_2016/Poster_deNBI-epi_SAB-Meeting_2016.pptx
@@ -2923,7 +2923,97 @@
                 <a:latin typeface="Arial"/>
                 <a:ea typeface="DejaVu Sans"/>
               </a:rPr>
-              <a:t>Contribute to open source projects to create, distribute and maintain bioinformatics software in an easy way. To achieve these goals we contribute actively to Bioconda, Biocontainers and Galaxy.</a:t>
+              <a:t>Contribute to open source projects to create, distribute and maintain bioinformatics software in an easy way. To achieve these goals we contribute actively to </a:t>
+            </a:r>
+            <a:r>
+              <a:rPr b="1" lang="en-US" sz="3200" spc="-1" strike="noStrike">
+                <a:solidFill>
+                  <a:srgbClr val="000000"/>
+                </a:solidFill>
+                <a:uFill>
+                  <a:solidFill>
+                    <a:srgbClr val="ffffff"/>
+                  </a:solidFill>
+                </a:uFill>
+                <a:latin typeface="Arial"/>
+                <a:ea typeface="DejaVu Sans"/>
+              </a:rPr>
+              <a:t>Bioconda</a:t>
+            </a:r>
+            <a:r>
+              <a:rPr b="0" lang="en-US" sz="3200" spc="-1" strike="noStrike">
+                <a:solidFill>
+                  <a:srgbClr val="000000"/>
+                </a:solidFill>
+                <a:uFill>
+                  <a:solidFill>
+                    <a:srgbClr val="ffffff"/>
+                  </a:solidFill>
+                </a:uFill>
+                <a:latin typeface="Arial"/>
+                <a:ea typeface="DejaVu Sans"/>
+              </a:rPr>
+              <a:t>, </a:t>
+            </a:r>
+            <a:r>
+              <a:rPr b="1" lang="en-US" sz="3200" spc="-1" strike="noStrike">
+                <a:solidFill>
+                  <a:srgbClr val="000000"/>
+                </a:solidFill>
+                <a:uFill>
+                  <a:solidFill>
+                    <a:srgbClr val="ffffff"/>
+                  </a:solidFill>
+                </a:uFill>
+                <a:latin typeface="Arial"/>
+                <a:ea typeface="DejaVu Sans"/>
+              </a:rPr>
+              <a:t>Biocontainers</a:t>
+            </a:r>
+            <a:r>
+              <a:rPr b="0" lang="en-US" sz="3200" spc="-1" strike="noStrike">
+                <a:solidFill>
+                  <a:srgbClr val="000000"/>
+                </a:solidFill>
+                <a:uFill>
+                  <a:solidFill>
+                    <a:srgbClr val="ffffff"/>
+                  </a:solidFill>
+                </a:uFill>
+                <a:latin typeface="Arial"/>
+                <a:ea typeface="DejaVu Sans"/>
+              </a:rPr>
+              <a:t> and </a:t>
+            </a:r>
+            <a:r>
+              <a:rPr b="1" lang="en-US" sz="3200" spc="-1" strike="noStrike">
+                <a:solidFill>
+                  <a:srgbClr val="000000"/>
+                </a:solidFill>
+                <a:uFill>
+                  <a:solidFill>
+                    <a:srgbClr val="ffffff"/>
+                  </a:solidFill>
+                </a:uFill>
+                <a:latin typeface="Arial"/>
+                <a:ea typeface="DejaVu Sans"/>
+              </a:rPr>
+              <a:t>Galaxy</a:t>
+            </a:r>
+            <a:r>
+              <a:rPr b="0" lang="en-US" sz="3200" spc="-1" strike="noStrike">
+                <a:solidFill>
+                  <a:srgbClr val="000000"/>
+                </a:solidFill>
+                <a:uFill>
+                  <a:solidFill>
+                    <a:srgbClr val="ffffff"/>
+                  </a:solidFill>
+                </a:uFill>
+                <a:latin typeface="Arial"/>
+                <a:ea typeface="DejaVu Sans"/>
+              </a:rPr>
+              <a:t>.</a:t>
             </a:r>
             <a:endParaRPr b="0" lang="en-US" sz="1800" spc="-1" strike="noStrike">
               <a:solidFill>
@@ -3572,45 +3662,7 @@
                 <a:latin typeface="Arial"/>
                 <a:ea typeface="DejaVu Sans"/>
               </a:rPr>
-              <a:t>One RNA-seq course in December</a:t>
-            </a:r>
-            <a:endParaRPr b="0" lang="en-US" sz="1800" spc="-1" strike="noStrike">
-              <a:solidFill>
-                <a:srgbClr val="000000"/>
-              </a:solidFill>
-              <a:uFill>
-                <a:solidFill>
-                  <a:srgbClr val="ffffff"/>
-                </a:solidFill>
-              </a:uFill>
-              <a:latin typeface="Arial"/>
-            </a:endParaRPr>
-          </a:p>
-          <a:p>
-            <a:pPr marL="216000" indent="-214920">
-              <a:lnSpc>
-                <a:spcPct val="115000"/>
-              </a:lnSpc>
-              <a:buClr>
-                <a:srgbClr val="000000"/>
-              </a:buClr>
-              <a:buFont typeface="Symbol"/>
-              <a:buChar char=""/>
-            </a:pPr>
-            <a:r>
-              <a:rPr b="0" lang="en-US" sz="3200" spc="-1" strike="noStrike">
-                <a:solidFill>
-                  <a:srgbClr val="000000"/>
-                </a:solidFill>
-                <a:uFill>
-                  <a:solidFill>
-                    <a:srgbClr val="ffffff"/>
-                  </a:solidFill>
-                </a:uFill>
-                <a:latin typeface="Arial"/>
-                <a:ea typeface="DejaVu Sans"/>
-              </a:rPr>
-              <a:t> </a:t>
+              <a:t>One RNA-seq course in December </a:t>
             </a:r>
             <a:endParaRPr b="0" lang="en-US" sz="1800" spc="-1" strike="noStrike">
               <a:solidFill>
@@ -3880,7 +3932,7 @@
                 <a:latin typeface="Arial"/>
                 <a:ea typeface="DejaVu Sans"/>
               </a:rPr>
-              <a:t>ChiCAGO</a:t>
+              <a:t>CHiCAGO</a:t>
             </a:r>
             <a:endParaRPr b="0" lang="en-US" sz="1800" spc="-1" strike="noStrike">
               <a:solidFill>
@@ -4621,7 +4673,7 @@
         <p:spPr>
           <a:xfrm>
             <a:off x="16642080" y="22402800"/>
-            <a:ext cx="5303520" cy="858240"/>
+            <a:ext cx="5303520" cy="1109880"/>
           </a:xfrm>
           <a:prstGeom prst="rect">
             <a:avLst/>
@@ -4635,7 +4687,7 @@
           <a:bodyPr lIns="90000" rIns="90000" tIns="45000" bIns="45000"/>
           <a:p>
             <a:r>
-              <a:rPr b="0" lang="en-US" sz="1800" spc="-1" strike="noStrike">
+              <a:rPr b="0" lang="en-US" sz="2400" spc="-1" strike="noStrike">
                 <a:solidFill>
                   <a:srgbClr val="000000"/>
                 </a:solidFill>
@@ -4648,7 +4700,7 @@
               </a:rPr>
               <a:t>Pricing system: How much would it cost to compute and store your data on Amazon EC2?</a:t>
             </a:r>
-            <a:endParaRPr b="0" lang="en-US" sz="1800" spc="-1" strike="noStrike">
+            <a:endParaRPr b="0" lang="en-US" sz="2400" spc="-1" strike="noStrike">
               <a:solidFill>
                 <a:srgbClr val="000000"/>
               </a:solidFill>
@@ -4670,8 +4722,8 @@
         </p:nvSpPr>
         <p:spPr>
           <a:xfrm>
-            <a:off x="23225760" y="22367520"/>
-            <a:ext cx="5943600" cy="858240"/>
+            <a:off x="23774400" y="22402800"/>
+            <a:ext cx="5212080" cy="858240"/>
           </a:xfrm>
           <a:prstGeom prst="rect">
             <a:avLst/>
@@ -4685,7 +4737,7 @@
           <a:bodyPr lIns="90000" rIns="90000" tIns="45000" bIns="45000"/>
           <a:p>
             <a:r>
-              <a:rPr b="0" lang="en-US" sz="1800" spc="-1" strike="noStrike">
+              <a:rPr b="0" lang="en-US" sz="2400" spc="-1" strike="noStrike">
                 <a:solidFill>
                   <a:srgbClr val="000000"/>
                 </a:solidFill>
@@ -4698,20 +4750,43 @@
               </a:rPr>
               <a:t>Comics: Have fun while Galaxy is computing your data.</a:t>
             </a:r>
-            <a:endParaRPr b="0" lang="en-US" sz="1800" spc="-1" strike="noStrike">
-              <a:solidFill>
-                <a:srgbClr val="000000"/>
-              </a:solidFill>
-              <a:uFill>
-                <a:solidFill>
-                  <a:srgbClr val="ffffff"/>
-                </a:solidFill>
-              </a:uFill>
-              <a:latin typeface="Arial"/>
-            </a:endParaRPr>
-          </a:p>
-        </p:txBody>
-      </p:sp>
+            <a:endParaRPr b="0" lang="en-US" sz="2400" spc="-1" strike="noStrike">
+              <a:solidFill>
+                <a:srgbClr val="000000"/>
+              </a:solidFill>
+              <a:uFill>
+                <a:solidFill>
+                  <a:srgbClr val="ffffff"/>
+                </a:solidFill>
+              </a:uFill>
+              <a:latin typeface="Arial"/>
+            </a:endParaRPr>
+          </a:p>
+        </p:txBody>
+      </p:sp>
+      <p:pic>
+        <p:nvPicPr>
+          <p:cNvPr id="78" name="" descr=""/>
+          <p:cNvPicPr/>
+          <p:nvPr/>
+        </p:nvPicPr>
+        <p:blipFill>
+          <a:blip r:embed="rId17"/>
+          <a:stretch/>
+        </p:blipFill>
+        <p:spPr>
+          <a:xfrm>
+            <a:off x="1202760" y="14264640"/>
+            <a:ext cx="12696120" cy="7498080"/>
+          </a:xfrm>
+          <a:prstGeom prst="rect">
+            <a:avLst/>
+          </a:prstGeom>
+          <a:ln>
+            <a:noFill/>
+          </a:ln>
+        </p:spPr>
+      </p:pic>
     </p:spTree>
   </p:cSld>
   <p:timing>

</xml_diff>